<commit_message>
lab for class 7
</commit_message>
<xml_diff>
--- a/Lectures/Class_6.pptx
+++ b/Lectures/Class_6.pptx
@@ -215,7 +215,7 @@
           <a:p>
             <a:fld id="{54847EFF-C863-C140-9952-3F1EB1196378}" type="datetimeFigureOut">
               <a:rPr lang="en-US" smtClean="0"/>
-              <a:t>3/3/20</a:t>
+              <a:t>3/17/20</a:t>
             </a:fld>
             <a:endParaRPr lang="en-US"/>
           </a:p>
@@ -614,7 +614,7 @@
           <a:p>
             <a:fld id="{5D36DD4B-AC82-DE42-B24B-3A0669FDECBA}" type="datetimeFigureOut">
               <a:rPr lang="en-US" smtClean="0"/>
-              <a:t>3/3/20</a:t>
+              <a:t>3/17/20</a:t>
             </a:fld>
             <a:endParaRPr lang="en-US"/>
           </a:p>
@@ -784,7 +784,7 @@
           <a:p>
             <a:fld id="{5D36DD4B-AC82-DE42-B24B-3A0669FDECBA}" type="datetimeFigureOut">
               <a:rPr lang="en-US" smtClean="0"/>
-              <a:t>3/3/20</a:t>
+              <a:t>3/17/20</a:t>
             </a:fld>
             <a:endParaRPr lang="en-US"/>
           </a:p>
@@ -964,7 +964,7 @@
           <a:p>
             <a:fld id="{5D36DD4B-AC82-DE42-B24B-3A0669FDECBA}" type="datetimeFigureOut">
               <a:rPr lang="en-US" smtClean="0"/>
-              <a:t>3/3/20</a:t>
+              <a:t>3/17/20</a:t>
             </a:fld>
             <a:endParaRPr lang="en-US"/>
           </a:p>
@@ -1134,7 +1134,7 @@
           <a:p>
             <a:fld id="{5D36DD4B-AC82-DE42-B24B-3A0669FDECBA}" type="datetimeFigureOut">
               <a:rPr lang="en-US" smtClean="0"/>
-              <a:t>3/3/20</a:t>
+              <a:t>3/17/20</a:t>
             </a:fld>
             <a:endParaRPr lang="en-US"/>
           </a:p>
@@ -1380,7 +1380,7 @@
           <a:p>
             <a:fld id="{5D36DD4B-AC82-DE42-B24B-3A0669FDECBA}" type="datetimeFigureOut">
               <a:rPr lang="en-US" smtClean="0"/>
-              <a:t>3/3/20</a:t>
+              <a:t>3/17/20</a:t>
             </a:fld>
             <a:endParaRPr lang="en-US"/>
           </a:p>
@@ -1612,7 +1612,7 @@
           <a:p>
             <a:fld id="{5D36DD4B-AC82-DE42-B24B-3A0669FDECBA}" type="datetimeFigureOut">
               <a:rPr lang="en-US" smtClean="0"/>
-              <a:t>3/3/20</a:t>
+              <a:t>3/17/20</a:t>
             </a:fld>
             <a:endParaRPr lang="en-US"/>
           </a:p>
@@ -1979,7 +1979,7 @@
           <a:p>
             <a:fld id="{5D36DD4B-AC82-DE42-B24B-3A0669FDECBA}" type="datetimeFigureOut">
               <a:rPr lang="en-US" smtClean="0"/>
-              <a:t>3/3/20</a:t>
+              <a:t>3/17/20</a:t>
             </a:fld>
             <a:endParaRPr lang="en-US"/>
           </a:p>
@@ -2097,7 +2097,7 @@
           <a:p>
             <a:fld id="{5D36DD4B-AC82-DE42-B24B-3A0669FDECBA}" type="datetimeFigureOut">
               <a:rPr lang="en-US" smtClean="0"/>
-              <a:t>3/3/20</a:t>
+              <a:t>3/17/20</a:t>
             </a:fld>
             <a:endParaRPr lang="en-US"/>
           </a:p>
@@ -2192,7 +2192,7 @@
           <a:p>
             <a:fld id="{5D36DD4B-AC82-DE42-B24B-3A0669FDECBA}" type="datetimeFigureOut">
               <a:rPr lang="en-US" smtClean="0"/>
-              <a:t>3/3/20</a:t>
+              <a:t>3/17/20</a:t>
             </a:fld>
             <a:endParaRPr lang="en-US"/>
           </a:p>
@@ -2469,7 +2469,7 @@
           <a:p>
             <a:fld id="{5D36DD4B-AC82-DE42-B24B-3A0669FDECBA}" type="datetimeFigureOut">
               <a:rPr lang="en-US" smtClean="0"/>
-              <a:t>3/3/20</a:t>
+              <a:t>3/17/20</a:t>
             </a:fld>
             <a:endParaRPr lang="en-US"/>
           </a:p>
@@ -2722,7 +2722,7 @@
           <a:p>
             <a:fld id="{5D36DD4B-AC82-DE42-B24B-3A0669FDECBA}" type="datetimeFigureOut">
               <a:rPr lang="en-US" smtClean="0"/>
-              <a:t>3/3/20</a:t>
+              <a:t>3/17/20</a:t>
             </a:fld>
             <a:endParaRPr lang="en-US"/>
           </a:p>
@@ -2935,7 +2935,7 @@
           <a:p>
             <a:fld id="{5D36DD4B-AC82-DE42-B24B-3A0669FDECBA}" type="datetimeFigureOut">
               <a:rPr lang="en-US" smtClean="0"/>
-              <a:t>3/3/20</a:t>
+              <a:t>3/17/20</a:t>
             </a:fld>
             <a:endParaRPr lang="en-US"/>
           </a:p>
@@ -3393,7 +3393,15 @@
           <a:p>
             <a:r>
               <a:rPr lang="en-US" dirty="0" smtClean="0"/>
-              <a:t>Class 5: Corpus Description, TF-IDF</a:t>
+              <a:t>Class </a:t>
+            </a:r>
+            <a:r>
+              <a:rPr lang="en-US" dirty="0" smtClean="0"/>
+              <a:t>6: </a:t>
+            </a:r>
+            <a:r>
+              <a:rPr lang="en-US" dirty="0" smtClean="0"/>
+              <a:t>Corpus Description, TF-IDF</a:t>
             </a:r>
             <a:endParaRPr lang="en-US" dirty="0"/>
           </a:p>
@@ -3722,11 +3730,7 @@
             </a:r>
             <a:r>
               <a:rPr lang="en-US" dirty="0" err="1" smtClean="0"/>
-              <a:t>t</a:t>
-            </a:r>
-            <a:r>
-              <a:rPr lang="en-US" dirty="0" err="1" smtClean="0"/>
-              <a:t>f</a:t>
+              <a:t>tf</a:t>
             </a:r>
             <a:r>
               <a:rPr lang="en-US" i="1" baseline="-25000" dirty="0" err="1" smtClean="0"/>
@@ -3844,8 +3848,8 @@
           </a:p>
         </p:txBody>
       </p:sp>
-      <mc:AlternateContent xmlns:mc="http://schemas.openxmlformats.org/markup-compatibility/2006">
-        <mc:Choice xmlns:a14="http://schemas.microsoft.com/office/drawing/2010/main" Requires="a14">
+      <mc:AlternateContent xmlns:mc="http://schemas.openxmlformats.org/markup-compatibility/2006" xmlns:a14="http://schemas.microsoft.com/office/drawing/2010/main">
+        <mc:Choice Requires="a14">
           <p:sp>
             <p:nvSpPr>
               <p:cNvPr id="3" name="Content Placeholder 2"/>
@@ -4043,7 +4047,7 @@
             </p:txBody>
           </p:sp>
         </mc:Choice>
-        <mc:Fallback>
+        <mc:Fallback xmlns="">
           <p:sp>
             <p:nvSpPr>
               <p:cNvPr id="3" name="Content Placeholder 2"/>
@@ -4415,8 +4419,8 @@
           </a:p>
         </p:txBody>
       </p:sp>
-      <mc:AlternateContent xmlns:mc="http://schemas.openxmlformats.org/markup-compatibility/2006">
-        <mc:Choice xmlns:a14="http://schemas.microsoft.com/office/drawing/2010/main" Requires="a14">
+      <mc:AlternateContent xmlns:mc="http://schemas.openxmlformats.org/markup-compatibility/2006" xmlns:a14="http://schemas.microsoft.com/office/drawing/2010/main">
+        <mc:Choice Requires="a14">
           <p:sp>
             <p:nvSpPr>
               <p:cNvPr id="3" name="Content Placeholder 2"/>
@@ -4486,13 +4490,7 @@
                       <a:rPr lang="en-US" i="1" dirty="0">
                         <a:latin typeface="Cambria Math" charset="0"/>
                       </a:rPr>
-                      <m:t>×</m:t>
-                    </m:r>
-                    <m:r>
-                      <a:rPr lang="en-US" i="1" dirty="0">
-                        <a:latin typeface="Cambria Math" charset="0"/>
-                      </a:rPr>
-                      <m:t> </m:t>
+                      <m:t>× </m:t>
                     </m:r>
                     <m:d>
                       <m:dPr>
@@ -4727,16 +4725,7 @@
                               <a:rPr lang="en-US" dirty="0">
                                 <a:latin typeface="Cambria Math" charset="0"/>
                               </a:rPr>
-                              <m:t>nu</m:t>
-                            </m:r>
-                            <m:r>
-                              <m:rPr>
-                                <m:sty m:val="p"/>
-                              </m:rPr>
-                              <a:rPr lang="en-US" dirty="0">
-                                <a:latin typeface="Cambria Math" charset="0"/>
-                              </a:rPr>
-                              <m:t>m</m:t>
+                              <m:t>num</m:t>
                             </m:r>
                             <m:r>
                               <a:rPr lang="en-US" dirty="0">
@@ -4896,13 +4885,7 @@
                       <a:rPr lang="en-US" i="1" dirty="0">
                         <a:latin typeface="Cambria Math" charset="0"/>
                       </a:rPr>
-                      <m:t>×</m:t>
-                    </m:r>
-                    <m:r>
-                      <a:rPr lang="en-US" i="1" dirty="0">
-                        <a:latin typeface="Cambria Math" charset="0"/>
-                      </a:rPr>
-                      <m:t> </m:t>
+                      <m:t>× </m:t>
                     </m:r>
                     <m:r>
                       <m:rPr>
@@ -5520,7 +5503,7 @@
             </p:txBody>
           </p:sp>
         </mc:Choice>
-        <mc:Fallback>
+        <mc:Fallback xmlns="">
           <p:sp>
             <p:nvSpPr>
               <p:cNvPr id="3" name="Content Placeholder 2"/>

</xml_diff>